<commit_message>
Choose Advance LSTM only
</commit_message>
<xml_diff>
--- a/Presentation.pptx
+++ b/Presentation.pptx
@@ -5,15 +5,16 @@
     <p:sldMasterId id="2147483648" r:id="rId1"/>
   </p:sldMasterIdLst>
   <p:notesMasterIdLst>
-    <p:notesMasterId r:id="rId8"/>
+    <p:notesMasterId r:id="rId9"/>
   </p:notesMasterIdLst>
   <p:sldIdLst>
-    <p:sldId id="256" r:id="rId2"/>
-    <p:sldId id="257" r:id="rId3"/>
-    <p:sldId id="258" r:id="rId4"/>
-    <p:sldId id="261" r:id="rId5"/>
-    <p:sldId id="259" r:id="rId6"/>
-    <p:sldId id="260" r:id="rId7"/>
+    <p:sldId id="262" r:id="rId2"/>
+    <p:sldId id="256" r:id="rId3"/>
+    <p:sldId id="257" r:id="rId4"/>
+    <p:sldId id="258" r:id="rId5"/>
+    <p:sldId id="261" r:id="rId6"/>
+    <p:sldId id="259" r:id="rId7"/>
+    <p:sldId id="260" r:id="rId8"/>
   </p:sldIdLst>
   <p:sldSz cx="12192000" cy="6858000"/>
   <p:notesSz cx="6858000" cy="9144000"/>
@@ -202,7 +203,7 @@
           <a:p>
             <a:fld id="{FCDB4432-DF5B-409F-8BB5-465BBAE20100}" type="datetimeFigureOut">
               <a:rPr lang="en-US" smtClean="0"/>
-              <a:t>18/06/2025</a:t>
+              <a:t>30/06/2025</a:t>
             </a:fld>
             <a:endParaRPr lang="en-US"/>
           </a:p>
@@ -537,7 +538,7 @@
           <a:p>
             <a:fld id="{5A93CF18-BEAB-4D03-8822-4865337587EA}" type="slidenum">
               <a:rPr lang="en-US" smtClean="0"/>
-              <a:t>1</a:t>
+              <a:t>2</a:t>
             </a:fld>
             <a:endParaRPr lang="en-US"/>
           </a:p>
@@ -703,7 +704,7 @@
           <a:p>
             <a:fld id="{3F42BB71-A338-4CB2-B2C4-61361743721C}" type="datetimeFigureOut">
               <a:rPr lang="en-US" smtClean="0"/>
-              <a:t>18/06/2025</a:t>
+              <a:t>30/06/2025</a:t>
             </a:fld>
             <a:endParaRPr lang="en-US"/>
           </a:p>
@@ -901,7 +902,7 @@
           <a:p>
             <a:fld id="{3F42BB71-A338-4CB2-B2C4-61361743721C}" type="datetimeFigureOut">
               <a:rPr lang="en-US" smtClean="0"/>
-              <a:t>18/06/2025</a:t>
+              <a:t>30/06/2025</a:t>
             </a:fld>
             <a:endParaRPr lang="en-US"/>
           </a:p>
@@ -1109,7 +1110,7 @@
           <a:p>
             <a:fld id="{3F42BB71-A338-4CB2-B2C4-61361743721C}" type="datetimeFigureOut">
               <a:rPr lang="en-US" smtClean="0"/>
-              <a:t>18/06/2025</a:t>
+              <a:t>30/06/2025</a:t>
             </a:fld>
             <a:endParaRPr lang="en-US"/>
           </a:p>
@@ -1307,7 +1308,7 @@
           <a:p>
             <a:fld id="{3F42BB71-A338-4CB2-B2C4-61361743721C}" type="datetimeFigureOut">
               <a:rPr lang="en-US" smtClean="0"/>
-              <a:t>18/06/2025</a:t>
+              <a:t>30/06/2025</a:t>
             </a:fld>
             <a:endParaRPr lang="en-US"/>
           </a:p>
@@ -1582,7 +1583,7 @@
           <a:p>
             <a:fld id="{3F42BB71-A338-4CB2-B2C4-61361743721C}" type="datetimeFigureOut">
               <a:rPr lang="en-US" smtClean="0"/>
-              <a:t>18/06/2025</a:t>
+              <a:t>30/06/2025</a:t>
             </a:fld>
             <a:endParaRPr lang="en-US"/>
           </a:p>
@@ -1847,7 +1848,7 @@
           <a:p>
             <a:fld id="{3F42BB71-A338-4CB2-B2C4-61361743721C}" type="datetimeFigureOut">
               <a:rPr lang="en-US" smtClean="0"/>
-              <a:t>18/06/2025</a:t>
+              <a:t>30/06/2025</a:t>
             </a:fld>
             <a:endParaRPr lang="en-US"/>
           </a:p>
@@ -2259,7 +2260,7 @@
           <a:p>
             <a:fld id="{3F42BB71-A338-4CB2-B2C4-61361743721C}" type="datetimeFigureOut">
               <a:rPr lang="en-US" smtClean="0"/>
-              <a:t>18/06/2025</a:t>
+              <a:t>30/06/2025</a:t>
             </a:fld>
             <a:endParaRPr lang="en-US"/>
           </a:p>
@@ -2400,7 +2401,7 @@
           <a:p>
             <a:fld id="{3F42BB71-A338-4CB2-B2C4-61361743721C}" type="datetimeFigureOut">
               <a:rPr lang="en-US" smtClean="0"/>
-              <a:t>18/06/2025</a:t>
+              <a:t>30/06/2025</a:t>
             </a:fld>
             <a:endParaRPr lang="en-US"/>
           </a:p>
@@ -2513,7 +2514,7 @@
           <a:p>
             <a:fld id="{3F42BB71-A338-4CB2-B2C4-61361743721C}" type="datetimeFigureOut">
               <a:rPr lang="en-US" smtClean="0"/>
-              <a:t>18/06/2025</a:t>
+              <a:t>30/06/2025</a:t>
             </a:fld>
             <a:endParaRPr lang="en-US"/>
           </a:p>
@@ -2824,7 +2825,7 @@
           <a:p>
             <a:fld id="{3F42BB71-A338-4CB2-B2C4-61361743721C}" type="datetimeFigureOut">
               <a:rPr lang="en-US" smtClean="0"/>
-              <a:t>18/06/2025</a:t>
+              <a:t>30/06/2025</a:t>
             </a:fld>
             <a:endParaRPr lang="en-US"/>
           </a:p>
@@ -3112,7 +3113,7 @@
           <a:p>
             <a:fld id="{3F42BB71-A338-4CB2-B2C4-61361743721C}" type="datetimeFigureOut">
               <a:rPr lang="en-US" smtClean="0"/>
-              <a:t>18/06/2025</a:t>
+              <a:t>30/06/2025</a:t>
             </a:fld>
             <a:endParaRPr lang="en-US"/>
           </a:p>
@@ -3353,7 +3354,7 @@
           <a:p>
             <a:fld id="{3F42BB71-A338-4CB2-B2C4-61361743721C}" type="datetimeFigureOut">
               <a:rPr lang="en-US" smtClean="0"/>
-              <a:t>18/06/2025</a:t>
+              <a:t>30/06/2025</a:t>
             </a:fld>
             <a:endParaRPr lang="en-US"/>
           </a:p>
@@ -3772,6 +3773,66 @@
       </p:grpSpPr>
       <p:pic>
         <p:nvPicPr>
+          <p:cNvPr id="5" name="Picture 4">
+            <a:extLst>
+              <a:ext uri="{FF2B5EF4-FFF2-40B4-BE49-F238E27FC236}">
+                <a16:creationId xmlns:a16="http://schemas.microsoft.com/office/drawing/2014/main" id="{C2E39041-33E0-6BE9-59D6-4127B4E07A17}"/>
+              </a:ext>
+            </a:extLst>
+          </p:cNvPr>
+          <p:cNvPicPr>
+            <a:picLocks noChangeAspect="1"/>
+          </p:cNvPicPr>
+          <p:nvPr/>
+        </p:nvPicPr>
+        <p:blipFill>
+          <a:blip r:embed="rId2"/>
+          <a:stretch>
+            <a:fillRect/>
+          </a:stretch>
+        </p:blipFill>
+        <p:spPr>
+          <a:xfrm>
+            <a:off x="3176180" y="137653"/>
+            <a:ext cx="5839640" cy="6582694"/>
+          </a:xfrm>
+          <a:prstGeom prst="rect">
+            <a:avLst/>
+          </a:prstGeom>
+        </p:spPr>
+      </p:pic>
+    </p:spTree>
+    <p:extLst>
+      <p:ext uri="{BB962C8B-B14F-4D97-AF65-F5344CB8AC3E}">
+        <p14:creationId xmlns:p14="http://schemas.microsoft.com/office/powerpoint/2010/main" val="4158889786"/>
+      </p:ext>
+    </p:extLst>
+  </p:cSld>
+  <p:clrMapOvr>
+    <a:masterClrMapping/>
+  </p:clrMapOvr>
+</p:sld>
+</file>
+
+<file path=ppt/slides/slide2.xml><?xml version="1.0" encoding="utf-8"?>
+<p:sld xmlns:a="http://schemas.openxmlformats.org/drawingml/2006/main" xmlns:r="http://schemas.openxmlformats.org/officeDocument/2006/relationships" xmlns:p="http://schemas.openxmlformats.org/presentationml/2006/main">
+  <p:cSld>
+    <p:spTree>
+      <p:nvGrpSpPr>
+        <p:cNvPr id="1" name=""/>
+        <p:cNvGrpSpPr/>
+        <p:nvPr/>
+      </p:nvGrpSpPr>
+      <p:grpSpPr>
+        <a:xfrm>
+          <a:off x="0" y="0"/>
+          <a:ext cx="0" cy="0"/>
+          <a:chOff x="0" y="0"/>
+          <a:chExt cx="0" cy="0"/>
+        </a:xfrm>
+      </p:grpSpPr>
+      <p:pic>
+        <p:nvPicPr>
           <p:cNvPr id="7" name="Picture 6">
             <a:extLst>
               <a:ext uri="{FF2B5EF4-FFF2-40B4-BE49-F238E27FC236}">
@@ -3855,7 +3916,7 @@
 </p:sld>
 </file>
 
-<file path=ppt/slides/slide2.xml><?xml version="1.0" encoding="utf-8"?>
+<file path=ppt/slides/slide3.xml><?xml version="1.0" encoding="utf-8"?>
 <p:sld xmlns:a="http://schemas.openxmlformats.org/drawingml/2006/main" xmlns:r="http://schemas.openxmlformats.org/officeDocument/2006/relationships" xmlns:p="http://schemas.openxmlformats.org/presentationml/2006/main">
   <p:cSld>
     <p:spTree>
@@ -3957,7 +4018,7 @@
 </p:sld>
 </file>
 
-<file path=ppt/slides/slide3.xml><?xml version="1.0" encoding="utf-8"?>
+<file path=ppt/slides/slide4.xml><?xml version="1.0" encoding="utf-8"?>
 <p:sld xmlns:a="http://schemas.openxmlformats.org/drawingml/2006/main" xmlns:r="http://schemas.openxmlformats.org/officeDocument/2006/relationships" xmlns:p="http://schemas.openxmlformats.org/presentationml/2006/main">
   <p:cSld>
     <p:spTree>
@@ -4034,7 +4095,7 @@
 </p:sld>
 </file>
 
-<file path=ppt/slides/slide4.xml><?xml version="1.0" encoding="utf-8"?>
+<file path=ppt/slides/slide5.xml><?xml version="1.0" encoding="utf-8"?>
 <p:sld xmlns:a="http://schemas.openxmlformats.org/drawingml/2006/main" xmlns:r="http://schemas.openxmlformats.org/officeDocument/2006/relationships" xmlns:p="http://schemas.openxmlformats.org/presentationml/2006/main">
   <p:cSld>
     <p:spTree>
@@ -4094,7 +4155,7 @@
 </p:sld>
 </file>
 
-<file path=ppt/slides/slide5.xml><?xml version="1.0" encoding="utf-8"?>
+<file path=ppt/slides/slide6.xml><?xml version="1.0" encoding="utf-8"?>
 <p:sld xmlns:a="http://schemas.openxmlformats.org/drawingml/2006/main" xmlns:r="http://schemas.openxmlformats.org/officeDocument/2006/relationships" xmlns:p="http://schemas.openxmlformats.org/presentationml/2006/main">
   <p:cSld>
     <p:spTree>
@@ -4169,7 +4230,7 @@
 </p:sld>
 </file>
 
-<file path=ppt/slides/slide6.xml><?xml version="1.0" encoding="utf-8"?>
+<file path=ppt/slides/slide7.xml><?xml version="1.0" encoding="utf-8"?>
 <p:sld xmlns:a="http://schemas.openxmlformats.org/drawingml/2006/main" xmlns:r="http://schemas.openxmlformats.org/officeDocument/2006/relationships" xmlns:p="http://schemas.openxmlformats.org/presentationml/2006/main">
   <p:cSld>
     <p:spTree>

</xml_diff>

<commit_message>
Remove back end. Change to CSV file.
</commit_message>
<xml_diff>
--- a/Presentation.pptx
+++ b/Presentation.pptx
@@ -5,7 +5,7 @@
     <p:sldMasterId id="2147483648" r:id="rId1"/>
   </p:sldMasterIdLst>
   <p:notesMasterIdLst>
-    <p:notesMasterId r:id="rId9"/>
+    <p:notesMasterId r:id="rId10"/>
   </p:notesMasterIdLst>
   <p:sldIdLst>
     <p:sldId id="262" r:id="rId2"/>
@@ -15,6 +15,7 @@
     <p:sldId id="261" r:id="rId6"/>
     <p:sldId id="259" r:id="rId7"/>
     <p:sldId id="260" r:id="rId8"/>
+    <p:sldId id="263" r:id="rId9"/>
   </p:sldIdLst>
   <p:sldSz cx="12192000" cy="6858000"/>
   <p:notesSz cx="6858000" cy="9144000"/>
@@ -203,7 +204,7 @@
           <a:p>
             <a:fld id="{FCDB4432-DF5B-409F-8BB5-465BBAE20100}" type="datetimeFigureOut">
               <a:rPr lang="en-US" smtClean="0"/>
-              <a:t>30/06/2025</a:t>
+              <a:t>09/07/2025</a:t>
             </a:fld>
             <a:endParaRPr lang="en-US"/>
           </a:p>
@@ -516,8 +517,19 @@
           <a:p>
             <a:r>
               <a:rPr lang="en-US" dirty="0"/>
-              <a:t>V1 </a:t>
-            </a:r>
+              <a:t>Data too small</a:t>
+            </a:r>
+          </a:p>
+          <a:p>
+            <a:r>
+              <a:rPr lang="en-US" dirty="0"/>
+              <a:t>No </a:t>
+            </a:r>
+            <a:r>
+              <a:rPr lang="en-US" dirty="0" err="1"/>
+              <a:t>volumn</a:t>
+            </a:r>
+            <a:endParaRPr lang="en-US" dirty="0"/>
           </a:p>
         </p:txBody>
       </p:sp>
@@ -548,6 +560,457 @@
     <p:extLst>
       <p:ext uri="{BB962C8B-B14F-4D97-AF65-F5344CB8AC3E}">
         <p14:creationId xmlns:p14="http://schemas.microsoft.com/office/powerpoint/2010/main" val="2382562381"/>
+      </p:ext>
+    </p:extLst>
+  </p:cSld>
+  <p:clrMapOvr>
+    <a:masterClrMapping/>
+  </p:clrMapOvr>
+</p:notes>
+</file>
+
+<file path=ppt/notesSlides/notesSlide2.xml><?xml version="1.0" encoding="utf-8"?>
+<p:notes xmlns:a="http://schemas.openxmlformats.org/drawingml/2006/main" xmlns:r="http://schemas.openxmlformats.org/officeDocument/2006/relationships" xmlns:p="http://schemas.openxmlformats.org/presentationml/2006/main">
+  <p:cSld>
+    <p:spTree>
+      <p:nvGrpSpPr>
+        <p:cNvPr id="1" name=""/>
+        <p:cNvGrpSpPr/>
+        <p:nvPr/>
+      </p:nvGrpSpPr>
+      <p:grpSpPr>
+        <a:xfrm>
+          <a:off x="0" y="0"/>
+          <a:ext cx="0" cy="0"/>
+          <a:chOff x="0" y="0"/>
+          <a:chExt cx="0" cy="0"/>
+        </a:xfrm>
+      </p:grpSpPr>
+      <p:sp>
+        <p:nvSpPr>
+          <p:cNvPr id="2" name="Slide Image Placeholder 1"/>
+          <p:cNvSpPr>
+            <a:spLocks noGrp="1" noRot="1" noChangeAspect="1"/>
+          </p:cNvSpPr>
+          <p:nvPr>
+            <p:ph type="sldImg"/>
+          </p:nvPr>
+        </p:nvSpPr>
+        <p:spPr/>
+      </p:sp>
+      <p:sp>
+        <p:nvSpPr>
+          <p:cNvPr id="3" name="Notes Placeholder 2"/>
+          <p:cNvSpPr>
+            <a:spLocks noGrp="1"/>
+          </p:cNvSpPr>
+          <p:nvPr>
+            <p:ph type="body" idx="1"/>
+          </p:nvPr>
+        </p:nvSpPr>
+        <p:spPr/>
+        <p:txBody>
+          <a:bodyPr/>
+          <a:lstStyle/>
+          <a:p>
+            <a:r>
+              <a:rPr lang="en-US" dirty="0"/>
+              <a:t>Data too big</a:t>
+            </a:r>
+          </a:p>
+          <a:p>
+            <a:r>
+              <a:rPr lang="en-US" dirty="0"/>
+              <a:t>No </a:t>
+            </a:r>
+            <a:r>
+              <a:rPr lang="en-US" dirty="0" err="1"/>
+              <a:t>volumne</a:t>
+            </a:r>
+            <a:endParaRPr lang="en-US" dirty="0"/>
+          </a:p>
+        </p:txBody>
+      </p:sp>
+      <p:sp>
+        <p:nvSpPr>
+          <p:cNvPr id="4" name="Slide Number Placeholder 3"/>
+          <p:cNvSpPr>
+            <a:spLocks noGrp="1"/>
+          </p:cNvSpPr>
+          <p:nvPr>
+            <p:ph type="sldNum" sz="quarter" idx="5"/>
+          </p:nvPr>
+        </p:nvSpPr>
+        <p:spPr/>
+        <p:txBody>
+          <a:bodyPr/>
+          <a:lstStyle/>
+          <a:p>
+            <a:fld id="{5A93CF18-BEAB-4D03-8822-4865337587EA}" type="slidenum">
+              <a:rPr lang="en-US" smtClean="0"/>
+              <a:t>3</a:t>
+            </a:fld>
+            <a:endParaRPr lang="en-US"/>
+          </a:p>
+        </p:txBody>
+      </p:sp>
+    </p:spTree>
+    <p:extLst>
+      <p:ext uri="{BB962C8B-B14F-4D97-AF65-F5344CB8AC3E}">
+        <p14:creationId xmlns:p14="http://schemas.microsoft.com/office/powerpoint/2010/main" val="3481378907"/>
+      </p:ext>
+    </p:extLst>
+  </p:cSld>
+  <p:clrMapOvr>
+    <a:masterClrMapping/>
+  </p:clrMapOvr>
+</p:notes>
+</file>
+
+<file path=ppt/notesSlides/notesSlide3.xml><?xml version="1.0" encoding="utf-8"?>
+<p:notes xmlns:a="http://schemas.openxmlformats.org/drawingml/2006/main" xmlns:r="http://schemas.openxmlformats.org/officeDocument/2006/relationships" xmlns:p="http://schemas.openxmlformats.org/presentationml/2006/main">
+  <p:cSld>
+    <p:spTree>
+      <p:nvGrpSpPr>
+        <p:cNvPr id="1" name=""/>
+        <p:cNvGrpSpPr/>
+        <p:nvPr/>
+      </p:nvGrpSpPr>
+      <p:grpSpPr>
+        <a:xfrm>
+          <a:off x="0" y="0"/>
+          <a:ext cx="0" cy="0"/>
+          <a:chOff x="0" y="0"/>
+          <a:chExt cx="0" cy="0"/>
+        </a:xfrm>
+      </p:grpSpPr>
+      <p:sp>
+        <p:nvSpPr>
+          <p:cNvPr id="2" name="Slide Image Placeholder 1"/>
+          <p:cNvSpPr>
+            <a:spLocks noGrp="1" noRot="1" noChangeAspect="1"/>
+          </p:cNvSpPr>
+          <p:nvPr>
+            <p:ph type="sldImg"/>
+          </p:nvPr>
+        </p:nvSpPr>
+        <p:spPr/>
+      </p:sp>
+      <p:sp>
+        <p:nvSpPr>
+          <p:cNvPr id="3" name="Notes Placeholder 2"/>
+          <p:cNvSpPr>
+            <a:spLocks noGrp="1"/>
+          </p:cNvSpPr>
+          <p:nvPr>
+            <p:ph type="body" idx="1"/>
+          </p:nvPr>
+        </p:nvSpPr>
+        <p:spPr/>
+        <p:txBody>
+          <a:bodyPr/>
+          <a:lstStyle/>
+          <a:p>
+            <a:r>
+              <a:rPr lang="en-US" dirty="0"/>
+              <a:t>GRU </a:t>
+            </a:r>
+            <a:r>
+              <a:rPr lang="en-US" dirty="0" err="1"/>
+              <a:t>unvariate</a:t>
+            </a:r>
+            <a:endParaRPr lang="en-US" dirty="0"/>
+          </a:p>
+        </p:txBody>
+      </p:sp>
+      <p:sp>
+        <p:nvSpPr>
+          <p:cNvPr id="4" name="Slide Number Placeholder 3"/>
+          <p:cNvSpPr>
+            <a:spLocks noGrp="1"/>
+          </p:cNvSpPr>
+          <p:nvPr>
+            <p:ph type="sldNum" sz="quarter" idx="5"/>
+          </p:nvPr>
+        </p:nvSpPr>
+        <p:spPr/>
+        <p:txBody>
+          <a:bodyPr/>
+          <a:lstStyle/>
+          <a:p>
+            <a:fld id="{5A93CF18-BEAB-4D03-8822-4865337587EA}" type="slidenum">
+              <a:rPr lang="en-US" smtClean="0"/>
+              <a:t>4</a:t>
+            </a:fld>
+            <a:endParaRPr lang="en-US"/>
+          </a:p>
+        </p:txBody>
+      </p:sp>
+    </p:spTree>
+    <p:extLst>
+      <p:ext uri="{BB962C8B-B14F-4D97-AF65-F5344CB8AC3E}">
+        <p14:creationId xmlns:p14="http://schemas.microsoft.com/office/powerpoint/2010/main" val="42590429"/>
+      </p:ext>
+    </p:extLst>
+  </p:cSld>
+  <p:clrMapOvr>
+    <a:masterClrMapping/>
+  </p:clrMapOvr>
+</p:notes>
+</file>
+
+<file path=ppt/notesSlides/notesSlide4.xml><?xml version="1.0" encoding="utf-8"?>
+<p:notes xmlns:a="http://schemas.openxmlformats.org/drawingml/2006/main" xmlns:r="http://schemas.openxmlformats.org/officeDocument/2006/relationships" xmlns:p="http://schemas.openxmlformats.org/presentationml/2006/main">
+  <p:cSld>
+    <p:spTree>
+      <p:nvGrpSpPr>
+        <p:cNvPr id="1" name=""/>
+        <p:cNvGrpSpPr/>
+        <p:nvPr/>
+      </p:nvGrpSpPr>
+      <p:grpSpPr>
+        <a:xfrm>
+          <a:off x="0" y="0"/>
+          <a:ext cx="0" cy="0"/>
+          <a:chOff x="0" y="0"/>
+          <a:chExt cx="0" cy="0"/>
+        </a:xfrm>
+      </p:grpSpPr>
+      <p:sp>
+        <p:nvSpPr>
+          <p:cNvPr id="2" name="Slide Image Placeholder 1"/>
+          <p:cNvSpPr>
+            <a:spLocks noGrp="1" noRot="1" noChangeAspect="1"/>
+          </p:cNvSpPr>
+          <p:nvPr>
+            <p:ph type="sldImg"/>
+          </p:nvPr>
+        </p:nvSpPr>
+        <p:spPr/>
+      </p:sp>
+      <p:sp>
+        <p:nvSpPr>
+          <p:cNvPr id="3" name="Notes Placeholder 2"/>
+          <p:cNvSpPr>
+            <a:spLocks noGrp="1"/>
+          </p:cNvSpPr>
+          <p:nvPr>
+            <p:ph type="body" idx="1"/>
+          </p:nvPr>
+        </p:nvSpPr>
+        <p:spPr/>
+        <p:txBody>
+          <a:bodyPr/>
+          <a:lstStyle/>
+          <a:p>
+            <a:r>
+              <a:rPr lang="en-US" dirty="0"/>
+              <a:t>HPG</a:t>
+            </a:r>
+          </a:p>
+        </p:txBody>
+      </p:sp>
+      <p:sp>
+        <p:nvSpPr>
+          <p:cNvPr id="4" name="Slide Number Placeholder 3"/>
+          <p:cNvSpPr>
+            <a:spLocks noGrp="1"/>
+          </p:cNvSpPr>
+          <p:nvPr>
+            <p:ph type="sldNum" sz="quarter" idx="5"/>
+          </p:nvPr>
+        </p:nvSpPr>
+        <p:spPr/>
+        <p:txBody>
+          <a:bodyPr/>
+          <a:lstStyle/>
+          <a:p>
+            <a:fld id="{5A93CF18-BEAB-4D03-8822-4865337587EA}" type="slidenum">
+              <a:rPr lang="en-US" smtClean="0"/>
+              <a:t>6</a:t>
+            </a:fld>
+            <a:endParaRPr lang="en-US"/>
+          </a:p>
+        </p:txBody>
+      </p:sp>
+    </p:spTree>
+    <p:extLst>
+      <p:ext uri="{BB962C8B-B14F-4D97-AF65-F5344CB8AC3E}">
+        <p14:creationId xmlns:p14="http://schemas.microsoft.com/office/powerpoint/2010/main" val="1423792030"/>
+      </p:ext>
+    </p:extLst>
+  </p:cSld>
+  <p:clrMapOvr>
+    <a:masterClrMapping/>
+  </p:clrMapOvr>
+</p:notes>
+</file>
+
+<file path=ppt/notesSlides/notesSlide5.xml><?xml version="1.0" encoding="utf-8"?>
+<p:notes xmlns:a="http://schemas.openxmlformats.org/drawingml/2006/main" xmlns:r="http://schemas.openxmlformats.org/officeDocument/2006/relationships" xmlns:p="http://schemas.openxmlformats.org/presentationml/2006/main">
+  <p:cSld>
+    <p:spTree>
+      <p:nvGrpSpPr>
+        <p:cNvPr id="1" name=""/>
+        <p:cNvGrpSpPr/>
+        <p:nvPr/>
+      </p:nvGrpSpPr>
+      <p:grpSpPr>
+        <a:xfrm>
+          <a:off x="0" y="0"/>
+          <a:ext cx="0" cy="0"/>
+          <a:chOff x="0" y="0"/>
+          <a:chExt cx="0" cy="0"/>
+        </a:xfrm>
+      </p:grpSpPr>
+      <p:sp>
+        <p:nvSpPr>
+          <p:cNvPr id="2" name="Slide Image Placeholder 1"/>
+          <p:cNvSpPr>
+            <a:spLocks noGrp="1" noRot="1" noChangeAspect="1"/>
+          </p:cNvSpPr>
+          <p:nvPr>
+            <p:ph type="sldImg"/>
+          </p:nvPr>
+        </p:nvSpPr>
+        <p:spPr/>
+      </p:sp>
+      <p:sp>
+        <p:nvSpPr>
+          <p:cNvPr id="3" name="Notes Placeholder 2"/>
+          <p:cNvSpPr>
+            <a:spLocks noGrp="1"/>
+          </p:cNvSpPr>
+          <p:nvPr>
+            <p:ph type="body" idx="1"/>
+          </p:nvPr>
+        </p:nvSpPr>
+        <p:spPr/>
+        <p:txBody>
+          <a:bodyPr/>
+          <a:lstStyle/>
+          <a:p>
+            <a:r>
+              <a:rPr lang="en-US" dirty="0"/>
+              <a:t>HPG</a:t>
+            </a:r>
+          </a:p>
+        </p:txBody>
+      </p:sp>
+      <p:sp>
+        <p:nvSpPr>
+          <p:cNvPr id="4" name="Slide Number Placeholder 3"/>
+          <p:cNvSpPr>
+            <a:spLocks noGrp="1"/>
+          </p:cNvSpPr>
+          <p:nvPr>
+            <p:ph type="sldNum" sz="quarter" idx="5"/>
+          </p:nvPr>
+        </p:nvSpPr>
+        <p:spPr/>
+        <p:txBody>
+          <a:bodyPr/>
+          <a:lstStyle/>
+          <a:p>
+            <a:fld id="{5A93CF18-BEAB-4D03-8822-4865337587EA}" type="slidenum">
+              <a:rPr lang="en-US" smtClean="0"/>
+              <a:t>7</a:t>
+            </a:fld>
+            <a:endParaRPr lang="en-US"/>
+          </a:p>
+        </p:txBody>
+      </p:sp>
+    </p:spTree>
+    <p:extLst>
+      <p:ext uri="{BB962C8B-B14F-4D97-AF65-F5344CB8AC3E}">
+        <p14:creationId xmlns:p14="http://schemas.microsoft.com/office/powerpoint/2010/main" val="327062827"/>
+      </p:ext>
+    </p:extLst>
+  </p:cSld>
+  <p:clrMapOvr>
+    <a:masterClrMapping/>
+  </p:clrMapOvr>
+</p:notes>
+</file>
+
+<file path=ppt/notesSlides/notesSlide6.xml><?xml version="1.0" encoding="utf-8"?>
+<p:notes xmlns:a="http://schemas.openxmlformats.org/drawingml/2006/main" xmlns:r="http://schemas.openxmlformats.org/officeDocument/2006/relationships" xmlns:p="http://schemas.openxmlformats.org/presentationml/2006/main">
+  <p:cSld>
+    <p:spTree>
+      <p:nvGrpSpPr>
+        <p:cNvPr id="1" name=""/>
+        <p:cNvGrpSpPr/>
+        <p:nvPr/>
+      </p:nvGrpSpPr>
+      <p:grpSpPr>
+        <a:xfrm>
+          <a:off x="0" y="0"/>
+          <a:ext cx="0" cy="0"/>
+          <a:chOff x="0" y="0"/>
+          <a:chExt cx="0" cy="0"/>
+        </a:xfrm>
+      </p:grpSpPr>
+      <p:sp>
+        <p:nvSpPr>
+          <p:cNvPr id="2" name="Slide Image Placeholder 1"/>
+          <p:cNvSpPr>
+            <a:spLocks noGrp="1" noRot="1" noChangeAspect="1"/>
+          </p:cNvSpPr>
+          <p:nvPr>
+            <p:ph type="sldImg"/>
+          </p:nvPr>
+        </p:nvSpPr>
+        <p:spPr/>
+      </p:sp>
+      <p:sp>
+        <p:nvSpPr>
+          <p:cNvPr id="3" name="Notes Placeholder 2"/>
+          <p:cNvSpPr>
+            <a:spLocks noGrp="1"/>
+          </p:cNvSpPr>
+          <p:nvPr>
+            <p:ph type="body" idx="1"/>
+          </p:nvPr>
+        </p:nvSpPr>
+        <p:spPr/>
+        <p:txBody>
+          <a:bodyPr/>
+          <a:lstStyle/>
+          <a:p>
+            <a:r>
+              <a:rPr lang="en-US" dirty="0"/>
+              <a:t>Add sentiment + technical analyst</a:t>
+            </a:r>
+          </a:p>
+        </p:txBody>
+      </p:sp>
+      <p:sp>
+        <p:nvSpPr>
+          <p:cNvPr id="4" name="Slide Number Placeholder 3"/>
+          <p:cNvSpPr>
+            <a:spLocks noGrp="1"/>
+          </p:cNvSpPr>
+          <p:nvPr>
+            <p:ph type="sldNum" sz="quarter" idx="5"/>
+          </p:nvPr>
+        </p:nvSpPr>
+        <p:spPr/>
+        <p:txBody>
+          <a:bodyPr/>
+          <a:lstStyle/>
+          <a:p>
+            <a:fld id="{5A93CF18-BEAB-4D03-8822-4865337587EA}" type="slidenum">
+              <a:rPr lang="en-US" smtClean="0"/>
+              <a:t>8</a:t>
+            </a:fld>
+            <a:endParaRPr lang="en-US"/>
+          </a:p>
+        </p:txBody>
+      </p:sp>
+    </p:spTree>
+    <p:extLst>
+      <p:ext uri="{BB962C8B-B14F-4D97-AF65-F5344CB8AC3E}">
+        <p14:creationId xmlns:p14="http://schemas.microsoft.com/office/powerpoint/2010/main" val="13515495"/>
       </p:ext>
     </p:extLst>
   </p:cSld>
@@ -704,7 +1167,7 @@
           <a:p>
             <a:fld id="{3F42BB71-A338-4CB2-B2C4-61361743721C}" type="datetimeFigureOut">
               <a:rPr lang="en-US" smtClean="0"/>
-              <a:t>30/06/2025</a:t>
+              <a:t>09/07/2025</a:t>
             </a:fld>
             <a:endParaRPr lang="en-US"/>
           </a:p>
@@ -902,7 +1365,7 @@
           <a:p>
             <a:fld id="{3F42BB71-A338-4CB2-B2C4-61361743721C}" type="datetimeFigureOut">
               <a:rPr lang="en-US" smtClean="0"/>
-              <a:t>30/06/2025</a:t>
+              <a:t>09/07/2025</a:t>
             </a:fld>
             <a:endParaRPr lang="en-US"/>
           </a:p>
@@ -1110,7 +1573,7 @@
           <a:p>
             <a:fld id="{3F42BB71-A338-4CB2-B2C4-61361743721C}" type="datetimeFigureOut">
               <a:rPr lang="en-US" smtClean="0"/>
-              <a:t>30/06/2025</a:t>
+              <a:t>09/07/2025</a:t>
             </a:fld>
             <a:endParaRPr lang="en-US"/>
           </a:p>
@@ -1308,7 +1771,7 @@
           <a:p>
             <a:fld id="{3F42BB71-A338-4CB2-B2C4-61361743721C}" type="datetimeFigureOut">
               <a:rPr lang="en-US" smtClean="0"/>
-              <a:t>30/06/2025</a:t>
+              <a:t>09/07/2025</a:t>
             </a:fld>
             <a:endParaRPr lang="en-US"/>
           </a:p>
@@ -1583,7 +2046,7 @@
           <a:p>
             <a:fld id="{3F42BB71-A338-4CB2-B2C4-61361743721C}" type="datetimeFigureOut">
               <a:rPr lang="en-US" smtClean="0"/>
-              <a:t>30/06/2025</a:t>
+              <a:t>09/07/2025</a:t>
             </a:fld>
             <a:endParaRPr lang="en-US"/>
           </a:p>
@@ -1848,7 +2311,7 @@
           <a:p>
             <a:fld id="{3F42BB71-A338-4CB2-B2C4-61361743721C}" type="datetimeFigureOut">
               <a:rPr lang="en-US" smtClean="0"/>
-              <a:t>30/06/2025</a:t>
+              <a:t>09/07/2025</a:t>
             </a:fld>
             <a:endParaRPr lang="en-US"/>
           </a:p>
@@ -2260,7 +2723,7 @@
           <a:p>
             <a:fld id="{3F42BB71-A338-4CB2-B2C4-61361743721C}" type="datetimeFigureOut">
               <a:rPr lang="en-US" smtClean="0"/>
-              <a:t>30/06/2025</a:t>
+              <a:t>09/07/2025</a:t>
             </a:fld>
             <a:endParaRPr lang="en-US"/>
           </a:p>
@@ -2401,7 +2864,7 @@
           <a:p>
             <a:fld id="{3F42BB71-A338-4CB2-B2C4-61361743721C}" type="datetimeFigureOut">
               <a:rPr lang="en-US" smtClean="0"/>
-              <a:t>30/06/2025</a:t>
+              <a:t>09/07/2025</a:t>
             </a:fld>
             <a:endParaRPr lang="en-US"/>
           </a:p>
@@ -2514,7 +2977,7 @@
           <a:p>
             <a:fld id="{3F42BB71-A338-4CB2-B2C4-61361743721C}" type="datetimeFigureOut">
               <a:rPr lang="en-US" smtClean="0"/>
-              <a:t>30/06/2025</a:t>
+              <a:t>09/07/2025</a:t>
             </a:fld>
             <a:endParaRPr lang="en-US"/>
           </a:p>
@@ -2825,7 +3288,7 @@
           <a:p>
             <a:fld id="{3F42BB71-A338-4CB2-B2C4-61361743721C}" type="datetimeFigureOut">
               <a:rPr lang="en-US" smtClean="0"/>
-              <a:t>30/06/2025</a:t>
+              <a:t>09/07/2025</a:t>
             </a:fld>
             <a:endParaRPr lang="en-US"/>
           </a:p>
@@ -3113,7 +3576,7 @@
           <a:p>
             <a:fld id="{3F42BB71-A338-4CB2-B2C4-61361743721C}" type="datetimeFigureOut">
               <a:rPr lang="en-US" smtClean="0"/>
-              <a:t>30/06/2025</a:t>
+              <a:t>09/07/2025</a:t>
             </a:fld>
             <a:endParaRPr lang="en-US"/>
           </a:p>
@@ -3354,7 +3817,7 @@
           <a:p>
             <a:fld id="{3F42BB71-A338-4CB2-B2C4-61361743721C}" type="datetimeFigureOut">
               <a:rPr lang="en-US" smtClean="0"/>
-              <a:t>30/06/2025</a:t>
+              <a:t>09/07/2025</a:t>
             </a:fld>
             <a:endParaRPr lang="en-US"/>
           </a:p>
@@ -3948,7 +4411,7 @@
           <p:nvPr/>
         </p:nvPicPr>
         <p:blipFill>
-          <a:blip r:embed="rId2">
+          <a:blip r:embed="rId3">
             <a:extLst>
               <a:ext uri="{28A0092B-C50C-407E-A947-70E740481C1C}">
                 <a14:useLocalDpi xmlns:a14="http://schemas.microsoft.com/office/drawing/2010/main" val="0"/>
@@ -3984,7 +4447,7 @@
           <p:nvPr/>
         </p:nvPicPr>
         <p:blipFill>
-          <a:blip r:embed="rId3">
+          <a:blip r:embed="rId4">
             <a:extLst>
               <a:ext uri="{28A0092B-C50C-407E-A947-70E740481C1C}">
                 <a14:useLocalDpi xmlns:a14="http://schemas.microsoft.com/office/drawing/2010/main" val="0"/>
@@ -4050,7 +4513,7 @@
           <p:nvPr/>
         </p:nvPicPr>
         <p:blipFill>
-          <a:blip r:embed="rId2">
+          <a:blip r:embed="rId3">
             <a:extLst>
               <a:ext uri="{28A0092B-C50C-407E-A947-70E740481C1C}">
                 <a14:useLocalDpi xmlns:a14="http://schemas.microsoft.com/office/drawing/2010/main" val="0"/>
@@ -4187,7 +4650,7 @@
           <p:nvPr/>
         </p:nvPicPr>
         <p:blipFill rotWithShape="1">
-          <a:blip r:embed="rId2">
+          <a:blip r:embed="rId3">
             <a:extLst>
               <a:ext uri="{28A0092B-C50C-407E-A947-70E740481C1C}">
                 <a14:useLocalDpi xmlns:a14="http://schemas.microsoft.com/office/drawing/2010/main" val="0"/>
@@ -4262,7 +4725,7 @@
           <p:nvPr/>
         </p:nvPicPr>
         <p:blipFill>
-          <a:blip r:embed="rId2"/>
+          <a:blip r:embed="rId3"/>
           <a:stretch>
             <a:fillRect/>
           </a:stretch>
@@ -4281,6 +4744,66 @@
     <p:extLst>
       <p:ext uri="{BB962C8B-B14F-4D97-AF65-F5344CB8AC3E}">
         <p14:creationId xmlns:p14="http://schemas.microsoft.com/office/powerpoint/2010/main" val="3009171935"/>
+      </p:ext>
+    </p:extLst>
+  </p:cSld>
+  <p:clrMapOvr>
+    <a:masterClrMapping/>
+  </p:clrMapOvr>
+</p:sld>
+</file>
+
+<file path=ppt/slides/slide8.xml><?xml version="1.0" encoding="utf-8"?>
+<p:sld xmlns:a="http://schemas.openxmlformats.org/drawingml/2006/main" xmlns:r="http://schemas.openxmlformats.org/officeDocument/2006/relationships" xmlns:p="http://schemas.openxmlformats.org/presentationml/2006/main">
+  <p:cSld>
+    <p:spTree>
+      <p:nvGrpSpPr>
+        <p:cNvPr id="1" name=""/>
+        <p:cNvGrpSpPr/>
+        <p:nvPr/>
+      </p:nvGrpSpPr>
+      <p:grpSpPr>
+        <a:xfrm>
+          <a:off x="0" y="0"/>
+          <a:ext cx="0" cy="0"/>
+          <a:chOff x="0" y="0"/>
+          <a:chExt cx="0" cy="0"/>
+        </a:xfrm>
+      </p:grpSpPr>
+      <p:pic>
+        <p:nvPicPr>
+          <p:cNvPr id="5" name="Picture 4">
+            <a:extLst>
+              <a:ext uri="{FF2B5EF4-FFF2-40B4-BE49-F238E27FC236}">
+                <a16:creationId xmlns:a16="http://schemas.microsoft.com/office/drawing/2014/main" id="{242688FB-2439-B381-C5B7-1FEC0AEA5313}"/>
+              </a:ext>
+            </a:extLst>
+          </p:cNvPr>
+          <p:cNvPicPr>
+            <a:picLocks noChangeAspect="1"/>
+          </p:cNvPicPr>
+          <p:nvPr/>
+        </p:nvPicPr>
+        <p:blipFill>
+          <a:blip r:embed="rId3"/>
+          <a:stretch>
+            <a:fillRect/>
+          </a:stretch>
+        </p:blipFill>
+        <p:spPr>
+          <a:xfrm>
+            <a:off x="931676" y="0"/>
+            <a:ext cx="10328648" cy="6858000"/>
+          </a:xfrm>
+          <a:prstGeom prst="rect">
+            <a:avLst/>
+          </a:prstGeom>
+        </p:spPr>
+      </p:pic>
+    </p:spTree>
+    <p:extLst>
+      <p:ext uri="{BB962C8B-B14F-4D97-AF65-F5344CB8AC3E}">
+        <p14:creationId xmlns:p14="http://schemas.microsoft.com/office/powerpoint/2010/main" val="121704567"/>
       </p:ext>
     </p:extLst>
   </p:cSld>

</xml_diff>

<commit_message>
change data prediction file location
</commit_message>
<xml_diff>
--- a/Presentation.pptx
+++ b/Presentation.pptx
@@ -5,7 +5,7 @@
     <p:sldMasterId id="2147483648" r:id="rId1"/>
   </p:sldMasterIdLst>
   <p:notesMasterIdLst>
-    <p:notesMasterId r:id="rId10"/>
+    <p:notesMasterId r:id="rId11"/>
   </p:notesMasterIdLst>
   <p:sldIdLst>
     <p:sldId id="262" r:id="rId2"/>
@@ -16,6 +16,7 @@
     <p:sldId id="259" r:id="rId7"/>
     <p:sldId id="260" r:id="rId8"/>
     <p:sldId id="263" r:id="rId9"/>
+    <p:sldId id="264" r:id="rId10"/>
   </p:sldIdLst>
   <p:sldSz cx="12192000" cy="6858000"/>
   <p:notesSz cx="6858000" cy="9144000"/>
@@ -1011,6 +1012,94 @@
     <p:extLst>
       <p:ext uri="{BB962C8B-B14F-4D97-AF65-F5344CB8AC3E}">
         <p14:creationId xmlns:p14="http://schemas.microsoft.com/office/powerpoint/2010/main" val="13515495"/>
+      </p:ext>
+    </p:extLst>
+  </p:cSld>
+  <p:clrMapOvr>
+    <a:masterClrMapping/>
+  </p:clrMapOvr>
+</p:notes>
+</file>
+
+<file path=ppt/notesSlides/notesSlide7.xml><?xml version="1.0" encoding="utf-8"?>
+<p:notes xmlns:a="http://schemas.openxmlformats.org/drawingml/2006/main" xmlns:r="http://schemas.openxmlformats.org/officeDocument/2006/relationships" xmlns:p="http://schemas.openxmlformats.org/presentationml/2006/main">
+  <p:cSld>
+    <p:spTree>
+      <p:nvGrpSpPr>
+        <p:cNvPr id="1" name=""/>
+        <p:cNvGrpSpPr/>
+        <p:nvPr/>
+      </p:nvGrpSpPr>
+      <p:grpSpPr>
+        <a:xfrm>
+          <a:off x="0" y="0"/>
+          <a:ext cx="0" cy="0"/>
+          <a:chOff x="0" y="0"/>
+          <a:chExt cx="0" cy="0"/>
+        </a:xfrm>
+      </p:grpSpPr>
+      <p:sp>
+        <p:nvSpPr>
+          <p:cNvPr id="2" name="Slide Image Placeholder 1"/>
+          <p:cNvSpPr>
+            <a:spLocks noGrp="1" noRot="1" noChangeAspect="1"/>
+          </p:cNvSpPr>
+          <p:nvPr>
+            <p:ph type="sldImg"/>
+          </p:nvPr>
+        </p:nvSpPr>
+        <p:spPr/>
+      </p:sp>
+      <p:sp>
+        <p:nvSpPr>
+          <p:cNvPr id="3" name="Notes Placeholder 2"/>
+          <p:cNvSpPr>
+            <a:spLocks noGrp="1"/>
+          </p:cNvSpPr>
+          <p:nvPr>
+            <p:ph type="body" idx="1"/>
+          </p:nvPr>
+        </p:nvSpPr>
+        <p:spPr/>
+        <p:txBody>
+          <a:bodyPr/>
+          <a:lstStyle/>
+          <a:p>
+            <a:r>
+              <a:rPr lang="en-US" b="1" dirty="0"/>
+              <a:t>VMD-LSTM-ELM Hybrid</a:t>
+            </a:r>
+            <a:endParaRPr lang="en-US" dirty="0"/>
+          </a:p>
+        </p:txBody>
+      </p:sp>
+      <p:sp>
+        <p:nvSpPr>
+          <p:cNvPr id="4" name="Slide Number Placeholder 3"/>
+          <p:cNvSpPr>
+            <a:spLocks noGrp="1"/>
+          </p:cNvSpPr>
+          <p:nvPr>
+            <p:ph type="sldNum" sz="quarter" idx="5"/>
+          </p:nvPr>
+        </p:nvSpPr>
+        <p:spPr/>
+        <p:txBody>
+          <a:bodyPr/>
+          <a:lstStyle/>
+          <a:p>
+            <a:fld id="{5A93CF18-BEAB-4D03-8822-4865337587EA}" type="slidenum">
+              <a:rPr lang="en-US" smtClean="0"/>
+              <a:t>9</a:t>
+            </a:fld>
+            <a:endParaRPr lang="en-US"/>
+          </a:p>
+        </p:txBody>
+      </p:sp>
+    </p:spTree>
+    <p:extLst>
+      <p:ext uri="{BB962C8B-B14F-4D97-AF65-F5344CB8AC3E}">
+        <p14:creationId xmlns:p14="http://schemas.microsoft.com/office/powerpoint/2010/main" val="4281389875"/>
       </p:ext>
     </p:extLst>
   </p:cSld>
@@ -4804,6 +4893,66 @@
     <p:extLst>
       <p:ext uri="{BB962C8B-B14F-4D97-AF65-F5344CB8AC3E}">
         <p14:creationId xmlns:p14="http://schemas.microsoft.com/office/powerpoint/2010/main" val="121704567"/>
+      </p:ext>
+    </p:extLst>
+  </p:cSld>
+  <p:clrMapOvr>
+    <a:masterClrMapping/>
+  </p:clrMapOvr>
+</p:sld>
+</file>
+
+<file path=ppt/slides/slide9.xml><?xml version="1.0" encoding="utf-8"?>
+<p:sld xmlns:a="http://schemas.openxmlformats.org/drawingml/2006/main" xmlns:r="http://schemas.openxmlformats.org/officeDocument/2006/relationships" xmlns:p="http://schemas.openxmlformats.org/presentationml/2006/main">
+  <p:cSld>
+    <p:spTree>
+      <p:nvGrpSpPr>
+        <p:cNvPr id="1" name=""/>
+        <p:cNvGrpSpPr/>
+        <p:nvPr/>
+      </p:nvGrpSpPr>
+      <p:grpSpPr>
+        <a:xfrm>
+          <a:off x="0" y="0"/>
+          <a:ext cx="0" cy="0"/>
+          <a:chOff x="0" y="0"/>
+          <a:chExt cx="0" cy="0"/>
+        </a:xfrm>
+      </p:grpSpPr>
+      <p:pic>
+        <p:nvPicPr>
+          <p:cNvPr id="5" name="Picture 4">
+            <a:extLst>
+              <a:ext uri="{FF2B5EF4-FFF2-40B4-BE49-F238E27FC236}">
+                <a16:creationId xmlns:a16="http://schemas.microsoft.com/office/drawing/2014/main" id="{AA624E54-9088-2015-A94E-4028FE3B569D}"/>
+              </a:ext>
+            </a:extLst>
+          </p:cNvPr>
+          <p:cNvPicPr>
+            <a:picLocks noChangeAspect="1"/>
+          </p:cNvPicPr>
+          <p:nvPr/>
+        </p:nvPicPr>
+        <p:blipFill>
+          <a:blip r:embed="rId3"/>
+          <a:stretch>
+            <a:fillRect/>
+          </a:stretch>
+        </p:blipFill>
+        <p:spPr>
+          <a:xfrm>
+            <a:off x="0" y="202027"/>
+            <a:ext cx="12192000" cy="6453945"/>
+          </a:xfrm>
+          <a:prstGeom prst="rect">
+            <a:avLst/>
+          </a:prstGeom>
+        </p:spPr>
+      </p:pic>
+    </p:spTree>
+    <p:extLst>
+      <p:ext uri="{BB962C8B-B14F-4D97-AF65-F5344CB8AC3E}">
+        <p14:creationId xmlns:p14="http://schemas.microsoft.com/office/powerpoint/2010/main" val="509480090"/>
       </p:ext>
     </p:extLst>
   </p:cSld>

</xml_diff>